<commit_message>
Update Linear Discriminant Analysis.pptx
</commit_message>
<xml_diff>
--- a/Week_11/Linear Discriminant Analysis.pptx
+++ b/Week_11/Linear Discriminant Analysis.pptx
@@ -109,6 +109,11 @@
       </a:defRPr>
     </a:lvl9pPr>
   </p:defaultTextStyle>
+  <p:extLst>
+    <p:ext uri="{EFAFB233-063F-42B5-8137-9DF3F51BA10A}">
+      <p15:sldGuideLst xmlns:p15="http://schemas.microsoft.com/office/powerpoint/2012/main"/>
+    </p:ext>
+  </p:extLst>
 </p:presentation>
 </file>
 
@@ -116,19 +121,50 @@
 <pc:chgInfo xmlns:a="http://schemas.openxmlformats.org/drawingml/2006/main" xmlns:r="http://schemas.openxmlformats.org/officeDocument/2006/relationships" xmlns:ac="http://schemas.microsoft.com/office/drawing/2013/main/command" xmlns:pc="http://schemas.microsoft.com/office/powerpoint/2013/main/command">
   <pc:docChgLst>
     <pc:chgData name="David Craig" userId="397bb13127774996" providerId="LiveId" clId="{BCADD76E-B745-4F94-9FF5-18EF75262C98}"/>
-    <pc:docChg chg="modSld">
-      <pc:chgData name="David Craig" userId="397bb13127774996" providerId="LiveId" clId="{BCADD76E-B745-4F94-9FF5-18EF75262C98}" dt="2023-05-30T07:40:38.056" v="9" actId="1076"/>
+    <pc:docChg chg="undo custSel modSld">
+      <pc:chgData name="David Craig" userId="397bb13127774996" providerId="LiveId" clId="{BCADD76E-B745-4F94-9FF5-18EF75262C98}" dt="2023-05-30T09:21:26.959" v="66" actId="1076"/>
       <pc:docMkLst>
         <pc:docMk/>
       </pc:docMkLst>
       <pc:sldChg chg="modSp mod">
-        <pc:chgData name="David Craig" userId="397bb13127774996" providerId="LiveId" clId="{BCADD76E-B745-4F94-9FF5-18EF75262C98}" dt="2023-05-30T07:40:38.056" v="9" actId="1076"/>
+        <pc:chgData name="David Craig" userId="397bb13127774996" providerId="LiveId" clId="{BCADD76E-B745-4F94-9FF5-18EF75262C98}" dt="2023-05-30T08:58:34.767" v="26" actId="6549"/>
+        <pc:sldMkLst>
+          <pc:docMk/>
+          <pc:sldMk cId="4127756533" sldId="256"/>
+        </pc:sldMkLst>
+        <pc:spChg chg="mod">
+          <ac:chgData name="David Craig" userId="397bb13127774996" providerId="LiveId" clId="{BCADD76E-B745-4F94-9FF5-18EF75262C98}" dt="2023-05-30T08:58:34.767" v="26" actId="6549"/>
+          <ac:spMkLst>
+            <pc:docMk/>
+            <pc:sldMk cId="4127756533" sldId="256"/>
+            <ac:spMk id="3" creationId="{B5AB8CCD-AF23-B883-AFEB-B3E1E6C9C93D}"/>
+          </ac:spMkLst>
+        </pc:spChg>
+      </pc:sldChg>
+      <pc:sldChg chg="modSp mod">
+        <pc:chgData name="David Craig" userId="397bb13127774996" providerId="LiveId" clId="{BCADD76E-B745-4F94-9FF5-18EF75262C98}" dt="2023-05-30T09:21:26.959" v="66" actId="1076"/>
         <pc:sldMkLst>
           <pc:docMk/>
           <pc:sldMk cId="1147655489" sldId="257"/>
         </pc:sldMkLst>
         <pc:spChg chg="mod">
-          <ac:chgData name="David Craig" userId="397bb13127774996" providerId="LiveId" clId="{BCADD76E-B745-4F94-9FF5-18EF75262C98}" dt="2023-05-30T07:40:33.803" v="8" actId="1076"/>
+          <ac:chgData name="David Craig" userId="397bb13127774996" providerId="LiveId" clId="{BCADD76E-B745-4F94-9FF5-18EF75262C98}" dt="2023-05-30T09:20:21.868" v="63" actId="20577"/>
+          <ac:spMkLst>
+            <pc:docMk/>
+            <pc:sldMk cId="1147655489" sldId="257"/>
+            <ac:spMk id="2" creationId="{AC2F0EB0-BA70-198E-250E-87AE0ADC1CF0}"/>
+          </ac:spMkLst>
+        </pc:spChg>
+        <pc:spChg chg="mod">
+          <ac:chgData name="David Craig" userId="397bb13127774996" providerId="LiveId" clId="{BCADD76E-B745-4F94-9FF5-18EF75262C98}" dt="2023-05-30T09:11:48.833" v="54" actId="20577"/>
+          <ac:spMkLst>
+            <pc:docMk/>
+            <pc:sldMk cId="1147655489" sldId="257"/>
+            <ac:spMk id="3" creationId="{94E86C00-4D54-ABEE-B3D5-8A578FB9318A}"/>
+          </ac:spMkLst>
+        </pc:spChg>
+        <pc:spChg chg="mod">
+          <ac:chgData name="David Craig" userId="397bb13127774996" providerId="LiveId" clId="{BCADD76E-B745-4F94-9FF5-18EF75262C98}" dt="2023-05-30T08:37:46.231" v="10" actId="1076"/>
           <ac:spMkLst>
             <pc:docMk/>
             <pc:sldMk cId="1147655489" sldId="257"/>
@@ -136,7 +172,7 @@
           </ac:spMkLst>
         </pc:spChg>
         <pc:picChg chg="mod">
-          <ac:chgData name="David Craig" userId="397bb13127774996" providerId="LiveId" clId="{BCADD76E-B745-4F94-9FF5-18EF75262C98}" dt="2023-05-30T07:40:28.564" v="7" actId="1076"/>
+          <ac:chgData name="David Craig" userId="397bb13127774996" providerId="LiveId" clId="{BCADD76E-B745-4F94-9FF5-18EF75262C98}" dt="2023-05-30T09:21:26.959" v="66" actId="1076"/>
           <ac:picMkLst>
             <pc:docMk/>
             <pc:sldMk cId="1147655489" sldId="257"/>
@@ -144,13 +180,36 @@
           </ac:picMkLst>
         </pc:picChg>
         <pc:picChg chg="mod">
-          <ac:chgData name="David Craig" userId="397bb13127774996" providerId="LiveId" clId="{BCADD76E-B745-4F94-9FF5-18EF75262C98}" dt="2023-05-30T07:40:38.056" v="9" actId="1076"/>
+          <ac:chgData name="David Craig" userId="397bb13127774996" providerId="LiveId" clId="{BCADD76E-B745-4F94-9FF5-18EF75262C98}" dt="2023-05-30T09:21:23.630" v="65" actId="14100"/>
           <ac:picMkLst>
             <pc:docMk/>
             <pc:sldMk cId="1147655489" sldId="257"/>
             <ac:picMk id="22" creationId="{7F3B299A-4DC8-BFEB-9D7D-638979A65A25}"/>
           </ac:picMkLst>
         </pc:picChg>
+      </pc:sldChg>
+      <pc:sldChg chg="modSp mod">
+        <pc:chgData name="David Craig" userId="397bb13127774996" providerId="LiveId" clId="{BCADD76E-B745-4F94-9FF5-18EF75262C98}" dt="2023-05-30T09:20:34.592" v="64"/>
+        <pc:sldMkLst>
+          <pc:docMk/>
+          <pc:sldMk cId="3302793088" sldId="258"/>
+        </pc:sldMkLst>
+        <pc:spChg chg="mod">
+          <ac:chgData name="David Craig" userId="397bb13127774996" providerId="LiveId" clId="{BCADD76E-B745-4F94-9FF5-18EF75262C98}" dt="2023-05-30T08:54:43.907" v="23" actId="20577"/>
+          <ac:spMkLst>
+            <pc:docMk/>
+            <pc:sldMk cId="3302793088" sldId="258"/>
+            <ac:spMk id="3" creationId="{A21F5A87-C15E-E39E-63DE-533FBAF9AF4F}"/>
+          </ac:spMkLst>
+        </pc:spChg>
+        <pc:spChg chg="mod">
+          <ac:chgData name="David Craig" userId="397bb13127774996" providerId="LiveId" clId="{BCADD76E-B745-4F94-9FF5-18EF75262C98}" dt="2023-05-30T09:20:34.592" v="64"/>
+          <ac:spMkLst>
+            <pc:docMk/>
+            <pc:sldMk cId="3302793088" sldId="258"/>
+            <ac:spMk id="4" creationId="{C9860BC1-0708-B923-1690-EC22CAE02D78}"/>
+          </ac:spMkLst>
+        </pc:spChg>
       </pc:sldChg>
     </pc:docChg>
   </pc:docChgLst>
@@ -743,7 +802,7 @@
           <a:p>
             <a:fld id="{BE7953ED-E3C0-4F6E-B721-18D811C4EB20}" type="datetimeFigureOut">
               <a:rPr lang="en-GB" smtClean="0"/>
-              <a:t>29/05/2023</a:t>
+              <a:t>30/05/2023</a:t>
             </a:fld>
             <a:endParaRPr lang="en-GB"/>
           </a:p>
@@ -943,7 +1002,7 @@
           <a:p>
             <a:fld id="{BE7953ED-E3C0-4F6E-B721-18D811C4EB20}" type="datetimeFigureOut">
               <a:rPr lang="en-GB" smtClean="0"/>
-              <a:t>29/05/2023</a:t>
+              <a:t>30/05/2023</a:t>
             </a:fld>
             <a:endParaRPr lang="en-GB"/>
           </a:p>
@@ -1153,7 +1212,7 @@
           <a:p>
             <a:fld id="{BE7953ED-E3C0-4F6E-B721-18D811C4EB20}" type="datetimeFigureOut">
               <a:rPr lang="en-GB" smtClean="0"/>
-              <a:t>29/05/2023</a:t>
+              <a:t>30/05/2023</a:t>
             </a:fld>
             <a:endParaRPr lang="en-GB"/>
           </a:p>
@@ -1353,7 +1412,7 @@
           <a:p>
             <a:fld id="{BE7953ED-E3C0-4F6E-B721-18D811C4EB20}" type="datetimeFigureOut">
               <a:rPr lang="en-GB" smtClean="0"/>
-              <a:t>29/05/2023</a:t>
+              <a:t>30/05/2023</a:t>
             </a:fld>
             <a:endParaRPr lang="en-GB"/>
           </a:p>
@@ -1629,7 +1688,7 @@
           <a:p>
             <a:fld id="{BE7953ED-E3C0-4F6E-B721-18D811C4EB20}" type="datetimeFigureOut">
               <a:rPr lang="en-GB" smtClean="0"/>
-              <a:t>29/05/2023</a:t>
+              <a:t>30/05/2023</a:t>
             </a:fld>
             <a:endParaRPr lang="en-GB"/>
           </a:p>
@@ -1897,7 +1956,7 @@
           <a:p>
             <a:fld id="{BE7953ED-E3C0-4F6E-B721-18D811C4EB20}" type="datetimeFigureOut">
               <a:rPr lang="en-GB" smtClean="0"/>
-              <a:t>29/05/2023</a:t>
+              <a:t>30/05/2023</a:t>
             </a:fld>
             <a:endParaRPr lang="en-GB"/>
           </a:p>
@@ -2312,7 +2371,7 @@
           <a:p>
             <a:fld id="{BE7953ED-E3C0-4F6E-B721-18D811C4EB20}" type="datetimeFigureOut">
               <a:rPr lang="en-GB" smtClean="0"/>
-              <a:t>29/05/2023</a:t>
+              <a:t>30/05/2023</a:t>
             </a:fld>
             <a:endParaRPr lang="en-GB"/>
           </a:p>
@@ -2454,7 +2513,7 @@
           <a:p>
             <a:fld id="{BE7953ED-E3C0-4F6E-B721-18D811C4EB20}" type="datetimeFigureOut">
               <a:rPr lang="en-GB" smtClean="0"/>
-              <a:t>29/05/2023</a:t>
+              <a:t>30/05/2023</a:t>
             </a:fld>
             <a:endParaRPr lang="en-GB"/>
           </a:p>
@@ -2567,7 +2626,7 @@
           <a:p>
             <a:fld id="{BE7953ED-E3C0-4F6E-B721-18D811C4EB20}" type="datetimeFigureOut">
               <a:rPr lang="en-GB" smtClean="0"/>
-              <a:t>29/05/2023</a:t>
+              <a:t>30/05/2023</a:t>
             </a:fld>
             <a:endParaRPr lang="en-GB"/>
           </a:p>
@@ -2880,7 +2939,7 @@
           <a:p>
             <a:fld id="{BE7953ED-E3C0-4F6E-B721-18D811C4EB20}" type="datetimeFigureOut">
               <a:rPr lang="en-GB" smtClean="0"/>
-              <a:t>29/05/2023</a:t>
+              <a:t>30/05/2023</a:t>
             </a:fld>
             <a:endParaRPr lang="en-GB"/>
           </a:p>
@@ -3169,7 +3228,7 @@
           <a:p>
             <a:fld id="{BE7953ED-E3C0-4F6E-B721-18D811C4EB20}" type="datetimeFigureOut">
               <a:rPr lang="en-GB" smtClean="0"/>
-              <a:t>29/05/2023</a:t>
+              <a:t>30/05/2023</a:t>
             </a:fld>
             <a:endParaRPr lang="en-GB"/>
           </a:p>
@@ -3412,7 +3471,7 @@
           <a:p>
             <a:fld id="{BE7953ED-E3C0-4F6E-B721-18D811C4EB20}" type="datetimeFigureOut">
               <a:rPr lang="en-GB" smtClean="0"/>
-              <a:t>29/05/2023</a:t>
+              <a:t>30/05/2023</a:t>
             </a:fld>
             <a:endParaRPr lang="en-GB"/>
           </a:p>
@@ -3890,7 +3949,7 @@
           <a:p>
             <a:r>
               <a:rPr lang="en-GB" dirty="0"/>
-              <a:t>(it’s just comparing apples to oranges… kind of)</a:t>
+              <a:t>it’s just comparing apples to oranges…</a:t>
             </a:r>
           </a:p>
         </p:txBody>
@@ -4003,7 +4062,7 @@
             <a:pPr algn="ctr"/>
             <a:r>
               <a:rPr lang="en-GB" dirty="0"/>
-              <a:t>Linear Discriminant Analysis</a:t>
+              <a:t>What is Linear Discriminant Analysis?</a:t>
             </a:r>
           </a:p>
         </p:txBody>
@@ -4026,7 +4085,7 @@
         </p:nvSpPr>
         <p:spPr>
           <a:xfrm>
-            <a:off x="65315" y="587779"/>
+            <a:off x="65315" y="551683"/>
             <a:ext cx="12126685" cy="2034123"/>
           </a:xfrm>
         </p:spPr>
@@ -4040,7 +4099,7 @@
               <a:rPr lang="en-GB" sz="2000" dirty="0">
                 <a:latin typeface="+mj-lt"/>
               </a:rPr>
-              <a:t>Statistical Method for reducing dimensionality and classifying variables in a data set.</a:t>
+              <a:t>Supervised Statistical Method for reducing dimensionality and classifying variables in a data set.</a:t>
             </a:r>
           </a:p>
           <a:p>
@@ -4345,7 +4404,7 @@
         </p:blipFill>
         <p:spPr>
           <a:xfrm>
-            <a:off x="8346824" y="2883013"/>
+            <a:off x="8880901" y="2919109"/>
             <a:ext cx="3311099" cy="1017061"/>
           </a:xfrm>
           <a:prstGeom prst="rect">
@@ -4375,8 +4434,8 @@
         </p:blipFill>
         <p:spPr>
           <a:xfrm>
-            <a:off x="65315" y="2496508"/>
-            <a:ext cx="8003073" cy="3167259"/>
+            <a:off x="65315" y="2466158"/>
+            <a:ext cx="8527442" cy="3374781"/>
           </a:xfrm>
           <a:prstGeom prst="rect">
             <a:avLst/>
@@ -4397,7 +4456,7 @@
         </p:nvSpPr>
         <p:spPr>
           <a:xfrm>
-            <a:off x="7064988" y="4569896"/>
+            <a:off x="6738416" y="5755601"/>
             <a:ext cx="6130412" cy="338554"/>
           </a:xfrm>
           <a:prstGeom prst="rect">
@@ -4570,12 +4629,12 @@
         <p:spPr>
           <a:xfrm>
             <a:off x="838200" y="855242"/>
-            <a:ext cx="10515600" cy="4351338"/>
+            <a:ext cx="10515600" cy="5153672"/>
           </a:xfrm>
         </p:spPr>
         <p:txBody>
           <a:bodyPr>
-            <a:normAutofit fontScale="92500" lnSpcReduction="20000"/>
+            <a:normAutofit fontScale="92500" lnSpcReduction="10000"/>
           </a:bodyPr>
           <a:lstStyle/>
           <a:p>
@@ -4583,7 +4642,7 @@
               <a:rPr lang="en-GB" sz="2200" dirty="0">
                 <a:latin typeface="+mj-lt"/>
               </a:rPr>
-              <a:t>Strengths-</a:t>
+              <a:t>Strengths</a:t>
             </a:r>
           </a:p>
           <a:p>
@@ -4596,21 +4655,7 @@
                 <a:effectLst/>
                 <a:latin typeface="+mj-lt"/>
               </a:rPr>
-              <a:t>compress the data into a lower-dimensional space, making it easier to visualize and </a:t>
-            </a:r>
-            <a:r>
-              <a:rPr lang="en-GB" sz="2200" b="0" i="0" dirty="0" err="1">
-                <a:effectLst/>
-                <a:latin typeface="+mj-lt"/>
-              </a:rPr>
-              <a:t>analyze</a:t>
-            </a:r>
-            <a:r>
-              <a:rPr lang="en-GB" sz="2200" b="0" i="0" dirty="0">
-                <a:effectLst/>
-                <a:latin typeface="+mj-lt"/>
-              </a:rPr>
-              <a:t>.</a:t>
+              <a:t>compress the data into a lower-dimensional space, making it easier to visualize and analyse.</a:t>
             </a:r>
           </a:p>
           <a:p>
@@ -4683,7 +4728,7 @@
               <a:rPr lang="en-GB" sz="2200" dirty="0">
                 <a:latin typeface="+mj-lt"/>
               </a:rPr>
-              <a:t>Real World Example: </a:t>
+              <a:t>Example: </a:t>
             </a:r>
           </a:p>
           <a:p>
@@ -4695,7 +4740,19 @@
                 <a:effectLst/>
                 <a:latin typeface="+mj-lt"/>
               </a:rPr>
-              <a:t>Medical Diagnostics, have medical records relating to variables such as clinical measurements such as blood pressure, cholesterol levels, body mass index (BMI) and disease diagnosis. </a:t>
+              <a:t>Medical Diagnostics, </a:t>
+            </a:r>
+          </a:p>
+          <a:p>
+            <a:pPr marL="0" indent="0">
+              <a:buNone/>
+            </a:pPr>
+            <a:r>
+              <a:rPr lang="en-GB" sz="2200" b="0" i="0" dirty="0">
+                <a:effectLst/>
+                <a:latin typeface="+mj-lt"/>
+              </a:rPr>
+              <a:t>have medical records relating to variables such as clinical measurements such as blood pressure, cholesterol levels, body mass index (BMI) and disease diagnosis. </a:t>
             </a:r>
           </a:p>
           <a:p>
@@ -4748,7 +4805,7 @@
             <a:pPr algn="ctr"/>
             <a:r>
               <a:rPr lang="en-GB" dirty="0"/>
-              <a:t>Linear Discriminant Analysis</a:t>
+              <a:t>What is Linear Discriminant Analysis?</a:t>
             </a:r>
           </a:p>
         </p:txBody>

</xml_diff>